<commit_message>
Add Files and Folders
</commit_message>
<xml_diff>
--- a/Project_Files/Mid-term_Climate Change Impact_Apparel Manufacturing_Calgary.pptx
+++ b/Project_Files/Mid-term_Climate Change Impact_Apparel Manufacturing_Calgary.pptx
@@ -6018,7 +6018,7 @@
           <a:p>
             <a:fld id="{62737283-AD75-5044-92E0-08EB7B1845D5}" type="datetimeFigureOut">
               <a:rPr lang="en-US" smtClean="0"/>
-              <a:t>10/5/2023</a:t>
+              <a:t>10/6/2023</a:t>
             </a:fld>
             <a:endParaRPr lang="en-US"/>
           </a:p>
@@ -7091,7 +7091,7 @@
           <a:p>
             <a:fld id="{9E0CE4F1-46FA-3549-98AD-C69533833387}" type="datetimeFigureOut">
               <a:rPr lang="en-US" smtClean="0"/>
-              <a:t>10/5/2023</a:t>
+              <a:t>10/6/2023</a:t>
             </a:fld>
             <a:endParaRPr lang="en-US"/>
           </a:p>
@@ -7259,7 +7259,7 @@
           <a:p>
             <a:fld id="{9E0CE4F1-46FA-3549-98AD-C69533833387}" type="datetimeFigureOut">
               <a:rPr lang="en-US" smtClean="0"/>
-              <a:t>10/5/2023</a:t>
+              <a:t>10/6/2023</a:t>
             </a:fld>
             <a:endParaRPr lang="en-US"/>
           </a:p>
@@ -7437,7 +7437,7 @@
           <a:p>
             <a:fld id="{9E0CE4F1-46FA-3549-98AD-C69533833387}" type="datetimeFigureOut">
               <a:rPr lang="en-US" smtClean="0"/>
-              <a:t>10/5/2023</a:t>
+              <a:t>10/6/2023</a:t>
             </a:fld>
             <a:endParaRPr lang="en-US"/>
           </a:p>
@@ -7605,7 +7605,7 @@
           <a:p>
             <a:fld id="{9E0CE4F1-46FA-3549-98AD-C69533833387}" type="datetimeFigureOut">
               <a:rPr lang="en-US" smtClean="0"/>
-              <a:t>10/5/2023</a:t>
+              <a:t>10/6/2023</a:t>
             </a:fld>
             <a:endParaRPr lang="en-US"/>
           </a:p>
@@ -7850,7 +7850,7 @@
           <a:p>
             <a:fld id="{9E0CE4F1-46FA-3549-98AD-C69533833387}" type="datetimeFigureOut">
               <a:rPr lang="en-US" smtClean="0"/>
-              <a:t>10/5/2023</a:t>
+              <a:t>10/6/2023</a:t>
             </a:fld>
             <a:endParaRPr lang="en-US"/>
           </a:p>
@@ -8135,7 +8135,7 @@
           <a:p>
             <a:fld id="{9E0CE4F1-46FA-3549-98AD-C69533833387}" type="datetimeFigureOut">
               <a:rPr lang="en-US" smtClean="0"/>
-              <a:t>10/5/2023</a:t>
+              <a:t>10/6/2023</a:t>
             </a:fld>
             <a:endParaRPr lang="en-US"/>
           </a:p>
@@ -8554,7 +8554,7 @@
           <a:p>
             <a:fld id="{9E0CE4F1-46FA-3549-98AD-C69533833387}" type="datetimeFigureOut">
               <a:rPr lang="en-US" smtClean="0"/>
-              <a:t>10/5/2023</a:t>
+              <a:t>10/6/2023</a:t>
             </a:fld>
             <a:endParaRPr lang="en-US"/>
           </a:p>
@@ -8671,7 +8671,7 @@
           <a:p>
             <a:fld id="{9E0CE4F1-46FA-3549-98AD-C69533833387}" type="datetimeFigureOut">
               <a:rPr lang="en-US" smtClean="0"/>
-              <a:t>10/5/2023</a:t>
+              <a:t>10/6/2023</a:t>
             </a:fld>
             <a:endParaRPr lang="en-US"/>
           </a:p>
@@ -8766,7 +8766,7 @@
           <a:p>
             <a:fld id="{9E0CE4F1-46FA-3549-98AD-C69533833387}" type="datetimeFigureOut">
               <a:rPr lang="en-US" smtClean="0"/>
-              <a:t>10/5/2023</a:t>
+              <a:t>10/6/2023</a:t>
             </a:fld>
             <a:endParaRPr lang="en-US"/>
           </a:p>
@@ -9041,7 +9041,7 @@
           <a:p>
             <a:fld id="{9E0CE4F1-46FA-3549-98AD-C69533833387}" type="datetimeFigureOut">
               <a:rPr lang="en-US" smtClean="0"/>
-              <a:t>10/5/2023</a:t>
+              <a:t>10/6/2023</a:t>
             </a:fld>
             <a:endParaRPr lang="en-US"/>
           </a:p>
@@ -9293,7 +9293,7 @@
           <a:p>
             <a:fld id="{9E0CE4F1-46FA-3549-98AD-C69533833387}" type="datetimeFigureOut">
               <a:rPr lang="en-US" smtClean="0"/>
-              <a:t>10/5/2023</a:t>
+              <a:t>10/6/2023</a:t>
             </a:fld>
             <a:endParaRPr lang="en-US"/>
           </a:p>
@@ -9504,7 +9504,7 @@
           <a:p>
             <a:fld id="{9E0CE4F1-46FA-3549-98AD-C69533833387}" type="datetimeFigureOut">
               <a:rPr lang="en-US" smtClean="0"/>
-              <a:t>10/5/2023</a:t>
+              <a:t>10/6/2023</a:t>
             </a:fld>
             <a:endParaRPr lang="en-US"/>
           </a:p>
@@ -15400,16 +15400,15 @@
             </a:r>
             <a:r>
               <a:rPr lang="en-US" sz="1600" b="1" dirty="0"/>
-              <a:t>, we plan to increase the production of winter jackets to meet potential demand for lighter cold-weather wear.</a:t>
+              <a:t>, we plan to reduce the production of winter jackets.</a:t>
             </a:r>
           </a:p>
           <a:p>
-            <a:pPr>
+            <a:pPr marL="0" indent="0">
               <a:lnSpc>
                 <a:spcPct val="90000"/>
               </a:lnSpc>
-              <a:buFont typeface="Wingdings" panose="05000000000000000000" pitchFamily="2" charset="2"/>
-              <a:buChar char="v"/>
+              <a:buNone/>
             </a:pPr>
             <a:endParaRPr lang="en-US" sz="1600" dirty="0"/>
           </a:p>
@@ -15422,7 +15421,7 @@
             </a:pPr>
             <a:r>
               <a:rPr lang="en-US" sz="1600" b="1" dirty="0"/>
-              <a:t>Spring Projections</a:t>
+              <a:t>Fall Expectations</a:t>
             </a:r>
             <a:r>
               <a:rPr lang="en-US" sz="1600" dirty="0"/>
@@ -15438,11 +15437,11 @@
             </a:pPr>
             <a:r>
               <a:rPr lang="en-US" sz="1600" dirty="0"/>
-              <a:t> Spring temperatures are forecasted to experience a slight dip, decreasing from 5.7°C in 2019 to 5.5°C in 2020. Given the relatively stable demand, </a:t>
+              <a:t>Fall temperatures are expected to rise, shifting from 5.1°C in 2019 to 5.7°C in 2020. </a:t>
             </a:r>
             <a:r>
-              <a:rPr lang="en-US" sz="1600" b="1" dirty="0"/>
-              <a:t>we intend to maintain current production levels for spring apparel.</a:t>
+              <a:rPr lang="en-US" sz="1600" b="1" i="1" dirty="0"/>
+              <a:t>To align with this changing climate pattern, we are considering a reduction in production.</a:t>
             </a:r>
           </a:p>
           <a:p>
@@ -16250,18 +16249,9 @@
               </a:lnSpc>
               <a:buNone/>
             </a:pPr>
-            <a:endParaRPr lang="en-US" sz="1800" dirty="0"/>
-          </a:p>
-          <a:p>
-            <a:pPr marL="0" indent="0">
-              <a:lnSpc>
-                <a:spcPct val="90000"/>
-              </a:lnSpc>
-              <a:buNone/>
-            </a:pPr>
             <a:r>
               <a:rPr lang="en-US" sz="1800" b="1" dirty="0"/>
-              <a:t>Fall Expectations</a:t>
+              <a:t>Spring Projections</a:t>
             </a:r>
             <a:r>
               <a:rPr lang="en-US" sz="1800" dirty="0"/>
@@ -16277,12 +16267,21 @@
             </a:pPr>
             <a:r>
               <a:rPr lang="en-US" sz="1800" dirty="0"/>
-              <a:t>Fall temperatures are expected to rise, shifting from 5.1°C in 2019 to 5.7°C in 2020. </a:t>
+              <a:t> Spring temperatures are forecasted to experience a slight dip, decreasing from 5.7°C in 2019 to 5.5°C in 2020. Given the relatively stable demand, </a:t>
             </a:r>
             <a:r>
-              <a:rPr lang="en-US" sz="1800" b="1" i="1" dirty="0"/>
-              <a:t>To align with this changing climate pattern, we are considering a reduction in production by 20% to optimize resources while meeting market needs effectively.</a:t>
+              <a:rPr lang="en-US" sz="1800" b="1" dirty="0"/>
+              <a:t>we intend to maintain current production levels for spring apparel.</a:t>
             </a:r>
+          </a:p>
+          <a:p>
+            <a:pPr marL="0" indent="0">
+              <a:lnSpc>
+                <a:spcPct val="90000"/>
+              </a:lnSpc>
+              <a:buNone/>
+            </a:pPr>
+            <a:endParaRPr lang="en-US" sz="1800" b="1" dirty="0"/>
           </a:p>
           <a:p>
             <a:pPr marL="0" indent="0">

</xml_diff>